<commit_message>
updating part 1 slides
</commit_message>
<xml_diff>
--- a/Slides/Workshop1 - Our First App.pptx
+++ b/Slides/Workshop1 - Our First App.pptx
@@ -5,7 +5,7 @@
     <p:sldMasterId id="2147483660" r:id="rId1"/>
   </p:sldMasterIdLst>
   <p:notesMasterIdLst>
-    <p:notesMasterId r:id="rId19"/>
+    <p:notesMasterId r:id="rId20"/>
   </p:notesMasterIdLst>
   <p:sldIdLst>
     <p:sldId id="325" r:id="rId2"/>
@@ -24,7 +24,8 @@
     <p:sldId id="295" r:id="rId15"/>
     <p:sldId id="296" r:id="rId16"/>
     <p:sldId id="323" r:id="rId17"/>
-    <p:sldId id="8394" r:id="rId18"/>
+    <p:sldId id="282" r:id="rId18"/>
+    <p:sldId id="8394" r:id="rId19"/>
   </p:sldIdLst>
   <p:sldSz cx="12192000" cy="6858000"/>
   <p:notesSz cx="6858000" cy="9144000"/>
@@ -238,7 +239,7 @@
           <a:p>
             <a:fld id="{A334C884-B1D7-A043-A4AA-521744755A4B}" type="datetimeFigureOut">
               <a:rPr lang="en-US" smtClean="0"/>
-              <a:t>3/30/2022</a:t>
+              <a:t>6/10/24</a:t>
             </a:fld>
             <a:endParaRPr lang="en-US"/>
           </a:p>
@@ -599,6 +600,168 @@
 </p:notes>
 </file>
 
+<file path=ppt/notesSlides/notesSlide10.xml><?xml version="1.0" encoding="utf-8"?>
+<p:notes xmlns:a="http://schemas.openxmlformats.org/drawingml/2006/main" xmlns:r="http://schemas.openxmlformats.org/officeDocument/2006/relationships" xmlns:p="http://schemas.openxmlformats.org/presentationml/2006/main">
+  <p:cSld>
+    <p:spTree>
+      <p:nvGrpSpPr>
+        <p:cNvPr id="1" name=""/>
+        <p:cNvGrpSpPr/>
+        <p:nvPr/>
+      </p:nvGrpSpPr>
+      <p:grpSpPr>
+        <a:xfrm>
+          <a:off x="0" y="0"/>
+          <a:ext cx="0" cy="0"/>
+          <a:chOff x="0" y="0"/>
+          <a:chExt cx="0" cy="0"/>
+        </a:xfrm>
+      </p:grpSpPr>
+      <p:sp>
+        <p:nvSpPr>
+          <p:cNvPr id="2" name="Slide Image Placeholder 1"/>
+          <p:cNvSpPr>
+            <a:spLocks noGrp="1" noRot="1" noChangeAspect="1"/>
+          </p:cNvSpPr>
+          <p:nvPr>
+            <p:ph type="sldImg"/>
+          </p:nvPr>
+        </p:nvSpPr>
+        <p:spPr/>
+      </p:sp>
+      <p:sp>
+        <p:nvSpPr>
+          <p:cNvPr id="3" name="Notes Placeholder 2"/>
+          <p:cNvSpPr>
+            <a:spLocks noGrp="1"/>
+          </p:cNvSpPr>
+          <p:nvPr>
+            <p:ph type="body" idx="1"/>
+          </p:nvPr>
+        </p:nvSpPr>
+        <p:spPr/>
+        <p:txBody>
+          <a:bodyPr/>
+          <a:lstStyle/>
+          <a:p>
+            <a:endParaRPr lang="en-US" dirty="0"/>
+          </a:p>
+        </p:txBody>
+      </p:sp>
+      <p:sp>
+        <p:nvSpPr>
+          <p:cNvPr id="4" name="Footer Placeholder 3"/>
+          <p:cNvSpPr>
+            <a:spLocks noGrp="1"/>
+          </p:cNvSpPr>
+          <p:nvPr>
+            <p:ph type="ftr" sz="quarter" idx="10"/>
+          </p:nvPr>
+        </p:nvSpPr>
+        <p:spPr/>
+        <p:txBody>
+          <a:bodyPr/>
+          <a:lstStyle/>
+          <a:p>
+            <a:pPr defTabSz="914099" eaLnBrk="0" hangingPunct="0"/>
+            <a:r>
+              <a:rPr lang="en-US" sz="400">
+                <a:gradFill>
+                  <a:gsLst>
+                    <a:gs pos="0">
+                      <a:prstClr val="black"/>
+                    </a:gs>
+                    <a:gs pos="100000">
+                      <a:prstClr val="black"/>
+                    </a:gs>
+                  </a:gsLst>
+                  <a:lin ang="5400000" scaled="0"/>
+                </a:gradFill>
+                <a:latin typeface="Segoe UI" pitchFamily="34" charset="0"/>
+                <a:ea typeface="Segoe UI" pitchFamily="34" charset="0"/>
+                <a:cs typeface="Segoe UI" pitchFamily="34" charset="0"/>
+              </a:rPr>
+              <a:t>© 2014 Microsoft Corporation. All rights reserved. Microsoft, Windows, and other product names are or may be registered trademarks and/or trademarks in the U.S. and/or other countries. The information herein is for informational purposes only and represents the current view of Microsoft Corporation as of the date of this presentation.  Because Microsoft must respond to changing market conditions, it should not be interpreted to be a commitment on the part of Microsoft, and Microsoft cannot guarantee the accuracy of any information provided after the date of this presentation.  MICROSOFT MAKES NO WARRANTIES, EXPRESS, IMPLIED OR STATUTORY, AS TO THE INFORMATION IN THIS PRESENTATION.</a:t>
+            </a:r>
+            <a:endParaRPr lang="en-US" sz="400" dirty="0">
+              <a:gradFill>
+                <a:gsLst>
+                  <a:gs pos="0">
+                    <a:prstClr val="black"/>
+                  </a:gs>
+                  <a:gs pos="100000">
+                    <a:prstClr val="black"/>
+                  </a:gs>
+                </a:gsLst>
+                <a:lin ang="5400000" scaled="0"/>
+              </a:gradFill>
+              <a:latin typeface="Segoe UI" pitchFamily="34" charset="0"/>
+              <a:ea typeface="Segoe UI" pitchFamily="34" charset="0"/>
+              <a:cs typeface="Segoe UI" pitchFamily="34" charset="0"/>
+            </a:endParaRPr>
+          </a:p>
+        </p:txBody>
+      </p:sp>
+      <p:sp>
+        <p:nvSpPr>
+          <p:cNvPr id="5" name="Date Placeholder 4"/>
+          <p:cNvSpPr>
+            <a:spLocks noGrp="1"/>
+          </p:cNvSpPr>
+          <p:nvPr>
+            <p:ph type="dt" idx="11"/>
+          </p:nvPr>
+        </p:nvSpPr>
+        <p:spPr/>
+        <p:txBody>
+          <a:bodyPr/>
+          <a:lstStyle/>
+          <a:p>
+            <a:fld id="{E74353ED-ACB2-44BF-A903-985B0AF962B7}" type="datetime1">
+              <a:rPr lang="en-US" smtClean="0"/>
+              <a:t>6/10/24</a:t>
+            </a:fld>
+            <a:endParaRPr lang="en-US" dirty="0"/>
+          </a:p>
+        </p:txBody>
+      </p:sp>
+      <p:sp>
+        <p:nvSpPr>
+          <p:cNvPr id="6" name="Slide Number Placeholder 5"/>
+          <p:cNvSpPr>
+            <a:spLocks noGrp="1"/>
+          </p:cNvSpPr>
+          <p:nvPr>
+            <p:ph type="sldNum" sz="quarter" idx="12"/>
+          </p:nvPr>
+        </p:nvSpPr>
+        <p:spPr/>
+        <p:txBody>
+          <a:bodyPr/>
+          <a:lstStyle/>
+          <a:p>
+            <a:fld id="{B4008EB6-D09E-4580-8CD6-DDB14511944F}" type="slidenum">
+              <a:rPr lang="en-US" smtClean="0"/>
+              <a:pPr/>
+              <a:t>18</a:t>
+            </a:fld>
+            <a:endParaRPr lang="en-US" dirty="0"/>
+          </a:p>
+        </p:txBody>
+      </p:sp>
+    </p:spTree>
+    <p:extLst>
+      <p:ext uri="{BB962C8B-B14F-4D97-AF65-F5344CB8AC3E}">
+        <p14:creationId xmlns:p14="http://schemas.microsoft.com/office/powerpoint/2010/main" val="317097467"/>
+      </p:ext>
+    </p:extLst>
+  </p:cSld>
+  <p:clrMapOvr>
+    <a:masterClrMapping/>
+  </p:clrMapOvr>
+</p:notes>
+</file>
+
 <file path=ppt/notesSlides/notesSlide2.xml><?xml version="1.0" encoding="utf-8"?>
 <p:notes xmlns:a="http://schemas.openxmlformats.org/drawingml/2006/main" xmlns:r="http://schemas.openxmlformats.org/officeDocument/2006/relationships" xmlns:p="http://schemas.openxmlformats.org/presentationml/2006/main">
   <p:cSld>
@@ -1356,7 +1519,7 @@
           <a:p>
             <a:fld id="{E74353ED-ACB2-44BF-A903-985B0AF962B7}" type="datetime1">
               <a:rPr lang="en-US" smtClean="0"/>
-              <a:t>3/30/2022</a:t>
+              <a:t>6/10/24</a:t>
             </a:fld>
             <a:endParaRPr lang="en-US" dirty="0"/>
           </a:p>
@@ -7723,7 +7886,7 @@
             </a:br>
             <a:r>
               <a:rPr lang="en-US" sz="5400" b="1" dirty="0"/>
-              <a:t>Our First App</a:t>
+              <a:t>Part 1: Our First App</a:t>
             </a:r>
           </a:p>
         </p:txBody>
@@ -7747,42 +7910,6 @@
           </a:p>
         </p:txBody>
       </p:sp>
-      <p:pic>
-        <p:nvPicPr>
-          <p:cNvPr id="14" name="Picture 13">
-            <a:extLst>
-              <a:ext uri="{FF2B5EF4-FFF2-40B4-BE49-F238E27FC236}">
-                <a16:creationId xmlns:a16="http://schemas.microsoft.com/office/drawing/2014/main" id="{2B9DAD5B-03C7-43FE-A3F9-29F44B946B48}"/>
-              </a:ext>
-            </a:extLst>
-          </p:cNvPr>
-          <p:cNvPicPr>
-            <a:picLocks noChangeAspect="1"/>
-          </p:cNvPicPr>
-          <p:nvPr/>
-        </p:nvPicPr>
-        <p:blipFill>
-          <a:blip r:embed="rId2">
-            <a:extLst>
-              <a:ext uri="{28A0092B-C50C-407E-A947-70E740481C1C}">
-                <a14:useLocalDpi xmlns:a14="http://schemas.microsoft.com/office/drawing/2010/main" val="0"/>
-              </a:ext>
-            </a:extLst>
-          </a:blip>
-          <a:stretch>
-            <a:fillRect/>
-          </a:stretch>
-        </p:blipFill>
-        <p:spPr>
-          <a:xfrm>
-            <a:off x="281182" y="4673121"/>
-            <a:ext cx="557054" cy="1890129"/>
-          </a:xfrm>
-          <a:prstGeom prst="rect">
-            <a:avLst/>
-          </a:prstGeom>
-        </p:spPr>
-      </p:pic>
       <p:sp>
         <p:nvSpPr>
           <p:cNvPr id="15" name="TextBox 14">
@@ -7797,7 +7924,7 @@
         </p:nvSpPr>
         <p:spPr>
           <a:xfrm>
-            <a:off x="1329544" y="4970898"/>
+            <a:off x="545772" y="5062410"/>
             <a:ext cx="5966529" cy="641215"/>
           </a:xfrm>
           <a:prstGeom prst="rect">
@@ -7832,7 +7959,7 @@
               <a:rPr lang="en-US" sz="1961" dirty="0">
                 <a:cs typeface="Arial"/>
               </a:rPr>
-              <a:t>James Montemagno</a:t>
+              <a:t>&lt;Name&gt;</a:t>
             </a:r>
           </a:p>
           <a:p>
@@ -7841,7 +7968,7 @@
                 <a:latin typeface="+mj-lt"/>
                 <a:cs typeface="Arial"/>
               </a:rPr>
-              <a:t>Principal Lead PM – Developer Community, Microsoft</a:t>
+              <a:t>&lt;Role&gt;</a:t>
             </a:r>
           </a:p>
         </p:txBody>
@@ -7860,7 +7987,7 @@
         </p:nvSpPr>
         <p:spPr>
           <a:xfrm>
-            <a:off x="1503286" y="5644613"/>
+            <a:off x="719514" y="5736125"/>
             <a:ext cx="2440268" cy="761555"/>
           </a:xfrm>
           <a:prstGeom prst="rect">
@@ -7884,7 +8011,7 @@
                 <a:latin typeface="+mj-lt"/>
                 <a:cs typeface="Arial"/>
               </a:rPr>
-              <a:t>@JamesMontemagno</a:t>
+              <a:t>@&lt;Twitter&gt;</a:t>
             </a:r>
           </a:p>
           <a:p>
@@ -7898,19 +8025,8 @@
                 <a:latin typeface="+mj-lt"/>
                 <a:cs typeface="Arial"/>
               </a:rPr>
-              <a:t>/</a:t>
-            </a:r>
-            <a:r>
-              <a:rPr lang="en-US" sz="1765" dirty="0" err="1">
-                <a:latin typeface="+mj-lt"/>
-                <a:cs typeface="Arial"/>
-              </a:rPr>
-              <a:t>JamesMontemagno</a:t>
-            </a:r>
-            <a:endParaRPr lang="en-US" sz="1765" dirty="0">
-              <a:latin typeface="+mj-lt"/>
-              <a:cs typeface="Arial"/>
-            </a:endParaRPr>
+              <a:t>/&lt;YouTube&gt;</a:t>
+            </a:r>
           </a:p>
         </p:txBody>
       </p:sp>
@@ -7920,6 +8036,53 @@
             <a:extLst>
               <a:ext uri="{FF2B5EF4-FFF2-40B4-BE49-F238E27FC236}">
                 <a16:creationId xmlns:a16="http://schemas.microsoft.com/office/drawing/2014/main" id="{5085402D-4D72-42FE-AEE3-940D913854DD}"/>
+              </a:ext>
+            </a:extLst>
+          </p:cNvPr>
+          <p:cNvPicPr>
+            <a:picLocks noChangeAspect="1" noChangeArrowheads="1"/>
+          </p:cNvPicPr>
+          <p:nvPr/>
+        </p:nvPicPr>
+        <p:blipFill>
+          <a:blip r:embed="rId2">
+            <a:extLst>
+              <a:ext uri="{28A0092B-C50C-407E-A947-70E740481C1C}">
+                <a14:useLocalDpi xmlns:a14="http://schemas.microsoft.com/office/drawing/2010/main" val="0"/>
+              </a:ext>
+            </a:extLst>
+          </a:blip>
+          <a:srcRect/>
+          <a:stretch>
+            <a:fillRect/>
+          </a:stretch>
+        </p:blipFill>
+        <p:spPr bwMode="auto">
+          <a:xfrm>
+            <a:off x="598110" y="5818062"/>
+            <a:ext cx="326511" cy="326511"/>
+          </a:xfrm>
+          <a:prstGeom prst="rect">
+            <a:avLst/>
+          </a:prstGeom>
+          <a:noFill/>
+          <a:extLst>
+            <a:ext uri="{909E8E84-426E-40DD-AFC4-6F175D3DCCD1}">
+              <a14:hiddenFill xmlns:a14="http://schemas.microsoft.com/office/drawing/2010/main">
+                <a:solidFill>
+                  <a:srgbClr val="FFFFFF"/>
+                </a:solidFill>
+              </a14:hiddenFill>
+            </a:ext>
+          </a:extLst>
+        </p:spPr>
+      </p:pic>
+      <p:pic>
+        <p:nvPicPr>
+          <p:cNvPr id="22" name="Picture 4" descr="See the source image">
+            <a:extLst>
+              <a:ext uri="{FF2B5EF4-FFF2-40B4-BE49-F238E27FC236}">
+                <a16:creationId xmlns:a16="http://schemas.microsoft.com/office/drawing/2014/main" id="{29903BF8-06F8-4657-993C-F74F21394EBB}"/>
               </a:ext>
             </a:extLst>
           </p:cNvPr>
@@ -7943,54 +8106,7 @@
         </p:blipFill>
         <p:spPr bwMode="auto">
           <a:xfrm>
-            <a:off x="1381882" y="5726550"/>
-            <a:ext cx="326511" cy="326511"/>
-          </a:xfrm>
-          <a:prstGeom prst="rect">
-            <a:avLst/>
-          </a:prstGeom>
-          <a:noFill/>
-          <a:extLst>
-            <a:ext uri="{909E8E84-426E-40DD-AFC4-6F175D3DCCD1}">
-              <a14:hiddenFill xmlns:a14="http://schemas.microsoft.com/office/drawing/2010/main">
-                <a:solidFill>
-                  <a:srgbClr val="FFFFFF"/>
-                </a:solidFill>
-              </a14:hiddenFill>
-            </a:ext>
-          </a:extLst>
-        </p:spPr>
-      </p:pic>
-      <p:pic>
-        <p:nvPicPr>
-          <p:cNvPr id="22" name="Picture 4" descr="See the source image">
-            <a:extLst>
-              <a:ext uri="{FF2B5EF4-FFF2-40B4-BE49-F238E27FC236}">
-                <a16:creationId xmlns:a16="http://schemas.microsoft.com/office/drawing/2014/main" id="{29903BF8-06F8-4657-993C-F74F21394EBB}"/>
-              </a:ext>
-            </a:extLst>
-          </p:cNvPr>
-          <p:cNvPicPr>
-            <a:picLocks noChangeAspect="1" noChangeArrowheads="1"/>
-          </p:cNvPicPr>
-          <p:nvPr/>
-        </p:nvPicPr>
-        <p:blipFill>
-          <a:blip r:embed="rId4">
-            <a:extLst>
-              <a:ext uri="{28A0092B-C50C-407E-A947-70E740481C1C}">
-                <a14:useLocalDpi xmlns:a14="http://schemas.microsoft.com/office/drawing/2010/main" val="0"/>
-              </a:ext>
-            </a:extLst>
-          </a:blip>
-          <a:srcRect/>
-          <a:stretch>
-            <a:fillRect/>
-          </a:stretch>
-        </p:blipFill>
-        <p:spPr bwMode="auto">
-          <a:xfrm>
-            <a:off x="1329544" y="6033686"/>
+            <a:off x="545772" y="6125198"/>
             <a:ext cx="431185" cy="431185"/>
           </a:xfrm>
           <a:prstGeom prst="rect">
@@ -11327,6 +11443,109 @@
           </a:prstGeom>
         </p:spPr>
       </p:pic>
+      <p:sp>
+        <p:nvSpPr>
+          <p:cNvPr id="3" name="TextBox 2">
+            <a:extLst>
+              <a:ext uri="{FF2B5EF4-FFF2-40B4-BE49-F238E27FC236}">
+                <a16:creationId xmlns:a16="http://schemas.microsoft.com/office/drawing/2014/main" id="{FD94B5A4-931C-27D7-5AFE-0109386DB0F8}"/>
+              </a:ext>
+            </a:extLst>
+          </p:cNvPr>
+          <p:cNvSpPr txBox="1"/>
+          <p:nvPr/>
+        </p:nvSpPr>
+        <p:spPr>
+          <a:xfrm>
+            <a:off x="1165664" y="3777342"/>
+            <a:ext cx="4495800" cy="627864"/>
+          </a:xfrm>
+          <a:prstGeom prst="rect">
+            <a:avLst/>
+          </a:prstGeom>
+          <a:noFill/>
+        </p:spPr>
+        <p:txBody>
+          <a:bodyPr wrap="square" lIns="182880" tIns="146304" rIns="182880" bIns="146304" rtlCol="0">
+            <a:spAutoFit/>
+          </a:bodyPr>
+          <a:lstStyle/>
+          <a:p>
+            <a:pPr>
+              <a:lnSpc>
+                <a:spcPct val="90000"/>
+              </a:lnSpc>
+              <a:spcAft>
+                <a:spcPts val="600"/>
+              </a:spcAft>
+            </a:pPr>
+            <a:r>
+              <a:rPr lang="en-US" sz="2400" dirty="0" err="1">
+                <a:gradFill>
+                  <a:gsLst>
+                    <a:gs pos="2917">
+                      <a:schemeClr val="tx1"/>
+                    </a:gs>
+                    <a:gs pos="30000">
+                      <a:schemeClr val="tx1"/>
+                    </a:gs>
+                  </a:gsLst>
+                  <a:lin ang="5400000" scaled="0"/>
+                </a:gradFill>
+              </a:rPr>
+              <a:t>aka.ms</a:t>
+            </a:r>
+            <a:r>
+              <a:rPr lang="en-US" sz="2400" dirty="0">
+                <a:gradFill>
+                  <a:gsLst>
+                    <a:gs pos="2917">
+                      <a:schemeClr val="tx1"/>
+                    </a:gs>
+                    <a:gs pos="30000">
+                      <a:schemeClr val="tx1"/>
+                    </a:gs>
+                  </a:gsLst>
+                  <a:lin ang="5400000" scaled="0"/>
+                </a:gradFill>
+              </a:rPr>
+              <a:t>/</a:t>
+            </a:r>
+            <a:r>
+              <a:rPr lang="en-US" sz="2400" dirty="0" err="1">
+                <a:gradFill>
+                  <a:gsLst>
+                    <a:gs pos="2917">
+                      <a:schemeClr val="tx1"/>
+                    </a:gs>
+                    <a:gs pos="30000">
+                      <a:schemeClr val="tx1"/>
+                    </a:gs>
+                  </a:gsLst>
+                  <a:lin ang="5400000" scaled="0"/>
+                </a:gradFill>
+              </a:rPr>
+              <a:t>maui</a:t>
+            </a:r>
+            <a:r>
+              <a:rPr lang="en-US" sz="2400" dirty="0">
+                <a:gradFill>
+                  <a:gsLst>
+                    <a:gs pos="2917">
+                      <a:schemeClr val="tx1"/>
+                    </a:gs>
+                    <a:gs pos="30000">
+                      <a:schemeClr val="tx1"/>
+                    </a:gs>
+                  </a:gsLst>
+                  <a:lin ang="5400000" scaled="0"/>
+                </a:gradFill>
+              </a:rPr>
+              <a:t>-workshop</a:t>
+            </a:r>
+          </a:p>
+        </p:txBody>
+      </p:sp>
     </p:spTree>
     <p:extLst>
       <p:ext uri="{BB962C8B-B14F-4D97-AF65-F5344CB8AC3E}">
@@ -11345,6 +11564,727 @@
 
 <file path=ppt/slides/slide17.xml><?xml version="1.0" encoding="utf-8"?>
 <p:sld xmlns:a="http://schemas.openxmlformats.org/drawingml/2006/main" xmlns:r="http://schemas.openxmlformats.org/officeDocument/2006/relationships" xmlns:p="http://schemas.openxmlformats.org/presentationml/2006/main">
+  <p:cSld>
+    <p:spTree>
+      <p:nvGrpSpPr>
+        <p:cNvPr id="1" name=""/>
+        <p:cNvGrpSpPr/>
+        <p:nvPr/>
+      </p:nvGrpSpPr>
+      <p:grpSpPr>
+        <a:xfrm>
+          <a:off x="0" y="0"/>
+          <a:ext cx="0" cy="0"/>
+          <a:chOff x="0" y="0"/>
+          <a:chExt cx="0" cy="0"/>
+        </a:xfrm>
+      </p:grpSpPr>
+      <p:sp>
+        <p:nvSpPr>
+          <p:cNvPr id="27" name="Text Placeholder 25"/>
+          <p:cNvSpPr txBox="1">
+            <a:spLocks/>
+          </p:cNvSpPr>
+          <p:nvPr/>
+        </p:nvSpPr>
+        <p:spPr bwMode="invGray">
+          <a:xfrm>
+            <a:off x="657703" y="1535076"/>
+            <a:ext cx="10321336" cy="821723"/>
+          </a:xfrm>
+          <a:prstGeom prst="rect">
+            <a:avLst/>
+          </a:prstGeom>
+        </p:spPr>
+        <p:txBody>
+          <a:bodyPr vert="horz" wrap="square" lIns="179285" tIns="143428" rIns="179285" bIns="143428" rtlCol="0" anchor="t">
+            <a:noAutofit/>
+          </a:bodyPr>
+          <a:lstStyle>
+            <a:lvl1pPr marL="0" indent="0" algn="l" defTabSz="914166" rtl="0" eaLnBrk="1" latinLnBrk="0" hangingPunct="1">
+              <a:spcBef>
+                <a:spcPct val="20000"/>
+              </a:spcBef>
+              <a:buFont typeface="Arial" pitchFamily="34" charset="0"/>
+              <a:buNone/>
+              <a:defRPr sz="6700" kern="1200" spc="-153">
+                <a:gradFill>
+                  <a:gsLst>
+                    <a:gs pos="0">
+                      <a:schemeClr val="tx1"/>
+                    </a:gs>
+                    <a:gs pos="100000">
+                      <a:schemeClr val="tx1"/>
+                    </a:gs>
+                  </a:gsLst>
+                  <a:lin ang="5400000" scaled="0"/>
+                </a:gradFill>
+                <a:latin typeface="+mj-lt"/>
+                <a:ea typeface="+mn-ea"/>
+                <a:cs typeface="+mn-cs"/>
+              </a:defRPr>
+            </a:lvl1pPr>
+            <a:lvl2pPr marL="0" indent="0" algn="l" defTabSz="914166" rtl="0" eaLnBrk="1" latinLnBrk="0" hangingPunct="1">
+              <a:spcBef>
+                <a:spcPct val="20000"/>
+              </a:spcBef>
+              <a:buFont typeface="Arial" pitchFamily="34" charset="0"/>
+              <a:buNone/>
+              <a:defRPr sz="2800" kern="1200">
+                <a:gradFill>
+                  <a:gsLst>
+                    <a:gs pos="0">
+                      <a:schemeClr val="tx1"/>
+                    </a:gs>
+                    <a:gs pos="100000">
+                      <a:schemeClr val="tx1"/>
+                    </a:gs>
+                  </a:gsLst>
+                  <a:lin ang="5400000" scaled="0"/>
+                </a:gradFill>
+                <a:latin typeface="+mn-lt"/>
+                <a:ea typeface="+mn-ea"/>
+                <a:cs typeface="+mn-cs"/>
+              </a:defRPr>
+            </a:lvl2pPr>
+            <a:lvl3pPr marL="457082" indent="-228541" algn="l" defTabSz="914166" rtl="0" eaLnBrk="1" latinLnBrk="0" hangingPunct="1">
+              <a:spcBef>
+                <a:spcPct val="20000"/>
+              </a:spcBef>
+              <a:buFont typeface="Arial" pitchFamily="34" charset="0"/>
+              <a:buChar char="•"/>
+              <a:defRPr sz="2400" kern="1200">
+                <a:gradFill>
+                  <a:gsLst>
+                    <a:gs pos="0">
+                      <a:schemeClr val="tx1"/>
+                    </a:gs>
+                    <a:gs pos="100000">
+                      <a:schemeClr val="tx1"/>
+                    </a:gs>
+                  </a:gsLst>
+                  <a:lin ang="5400000" scaled="0"/>
+                </a:gradFill>
+                <a:latin typeface="+mn-lt"/>
+                <a:ea typeface="+mn-ea"/>
+                <a:cs typeface="+mn-cs"/>
+              </a:defRPr>
+            </a:lvl3pPr>
+            <a:lvl4pPr marL="739586" indent="-282503" algn="l" defTabSz="914166" rtl="0" eaLnBrk="1" latinLnBrk="0" hangingPunct="1">
+              <a:spcBef>
+                <a:spcPct val="20000"/>
+              </a:spcBef>
+              <a:buFont typeface="Arial" pitchFamily="34" charset="0"/>
+              <a:buChar char="–"/>
+              <a:defRPr sz="2000" kern="1200">
+                <a:gradFill>
+                  <a:gsLst>
+                    <a:gs pos="0">
+                      <a:schemeClr val="tx1"/>
+                    </a:gs>
+                    <a:gs pos="100000">
+                      <a:schemeClr val="tx1"/>
+                    </a:gs>
+                  </a:gsLst>
+                  <a:lin ang="5400000" scaled="0"/>
+                </a:gradFill>
+                <a:latin typeface="+mn-lt"/>
+                <a:ea typeface="+mn-ea"/>
+                <a:cs typeface="+mn-cs"/>
+              </a:defRPr>
+            </a:lvl4pPr>
+            <a:lvl5pPr marL="1033199" indent="-293612" algn="l" defTabSz="914166" rtl="0" eaLnBrk="1" latinLnBrk="0" hangingPunct="1">
+              <a:spcBef>
+                <a:spcPct val="20000"/>
+              </a:spcBef>
+              <a:buFont typeface="Arial" pitchFamily="34" charset="0"/>
+              <a:buChar char="»"/>
+              <a:defRPr sz="1800" kern="1200">
+                <a:gradFill>
+                  <a:gsLst>
+                    <a:gs pos="0">
+                      <a:schemeClr val="tx1"/>
+                    </a:gs>
+                    <a:gs pos="100000">
+                      <a:schemeClr val="tx1"/>
+                    </a:gs>
+                  </a:gsLst>
+                  <a:lin ang="5400000" scaled="0"/>
+                </a:gradFill>
+                <a:latin typeface="+mn-lt"/>
+                <a:ea typeface="+mn-ea"/>
+                <a:cs typeface="+mn-cs"/>
+              </a:defRPr>
+            </a:lvl5pPr>
+            <a:lvl6pPr marL="2513956" indent="-228541" algn="l" defTabSz="914166" rtl="0" eaLnBrk="1" latinLnBrk="0" hangingPunct="1">
+              <a:spcBef>
+                <a:spcPct val="20000"/>
+              </a:spcBef>
+              <a:buFont typeface="Arial" pitchFamily="34" charset="0"/>
+              <a:buChar char="•"/>
+              <a:defRPr sz="2000" kern="1200">
+                <a:solidFill>
+                  <a:schemeClr val="tx1"/>
+                </a:solidFill>
+                <a:latin typeface="+mn-lt"/>
+                <a:ea typeface="+mn-ea"/>
+                <a:cs typeface="+mn-cs"/>
+              </a:defRPr>
+            </a:lvl6pPr>
+            <a:lvl7pPr marL="2971038" indent="-228541" algn="l" defTabSz="914166" rtl="0" eaLnBrk="1" latinLnBrk="0" hangingPunct="1">
+              <a:spcBef>
+                <a:spcPct val="20000"/>
+              </a:spcBef>
+              <a:buFont typeface="Arial" pitchFamily="34" charset="0"/>
+              <a:buChar char="•"/>
+              <a:defRPr sz="2000" kern="1200">
+                <a:solidFill>
+                  <a:schemeClr val="tx1"/>
+                </a:solidFill>
+                <a:latin typeface="+mn-lt"/>
+                <a:ea typeface="+mn-ea"/>
+                <a:cs typeface="+mn-cs"/>
+              </a:defRPr>
+            </a:lvl7pPr>
+            <a:lvl8pPr marL="3428122" indent="-228541" algn="l" defTabSz="914166" rtl="0" eaLnBrk="1" latinLnBrk="0" hangingPunct="1">
+              <a:spcBef>
+                <a:spcPct val="20000"/>
+              </a:spcBef>
+              <a:buFont typeface="Arial" pitchFamily="34" charset="0"/>
+              <a:buChar char="•"/>
+              <a:defRPr sz="2000" kern="1200">
+                <a:solidFill>
+                  <a:schemeClr val="tx1"/>
+                </a:solidFill>
+                <a:latin typeface="+mn-lt"/>
+                <a:ea typeface="+mn-ea"/>
+                <a:cs typeface="+mn-cs"/>
+              </a:defRPr>
+            </a:lvl8pPr>
+            <a:lvl9pPr marL="3885204" indent="-228541" algn="l" defTabSz="914166" rtl="0" eaLnBrk="1" latinLnBrk="0" hangingPunct="1">
+              <a:spcBef>
+                <a:spcPct val="20000"/>
+              </a:spcBef>
+              <a:buFont typeface="Arial" pitchFamily="34" charset="0"/>
+              <a:buChar char="•"/>
+              <a:defRPr sz="2000" kern="1200">
+                <a:solidFill>
+                  <a:schemeClr val="tx1"/>
+                </a:solidFill>
+                <a:latin typeface="+mn-lt"/>
+                <a:ea typeface="+mn-ea"/>
+                <a:cs typeface="+mn-cs"/>
+              </a:defRPr>
+            </a:lvl9pPr>
+          </a:lstStyle>
+          <a:p>
+            <a:pPr defTabSz="914367">
+              <a:lnSpc>
+                <a:spcPct val="60000"/>
+              </a:lnSpc>
+              <a:buClr>
+                <a:srgbClr val="FFFFFF"/>
+              </a:buClr>
+              <a:buSzPct val="90000"/>
+            </a:pPr>
+            <a:r>
+              <a:rPr lang="en-US" sz="7646" spc="0" dirty="0">
+                <a:solidFill>
+                  <a:schemeClr val="tx1"/>
+                </a:solidFill>
+              </a:rPr>
+              <a:t>20 Minute Break</a:t>
+            </a:r>
+            <a:endParaRPr lang="en-US" sz="7646" spc="0" dirty="0">
+              <a:solidFill>
+                <a:schemeClr val="tx1"/>
+              </a:solidFill>
+              <a:latin typeface="+mn-lt"/>
+            </a:endParaRPr>
+          </a:p>
+        </p:txBody>
+      </p:sp>
+      <p:sp>
+        <p:nvSpPr>
+          <p:cNvPr id="8" name="TextBox 7"/>
+          <p:cNvSpPr txBox="1"/>
+          <p:nvPr/>
+        </p:nvSpPr>
+        <p:spPr>
+          <a:xfrm>
+            <a:off x="4145965" y="-846623"/>
+            <a:ext cx="362072" cy="621556"/>
+          </a:xfrm>
+          <a:prstGeom prst="rect">
+            <a:avLst/>
+          </a:prstGeom>
+          <a:noFill/>
+        </p:spPr>
+        <p:txBody>
+          <a:bodyPr wrap="none" lIns="179285" tIns="143428" rIns="179285" bIns="143428" rtlCol="0">
+            <a:spAutoFit/>
+          </a:bodyPr>
+          <a:lstStyle/>
+          <a:p>
+            <a:pPr>
+              <a:lnSpc>
+                <a:spcPct val="90000"/>
+              </a:lnSpc>
+              <a:spcAft>
+                <a:spcPts val="588"/>
+              </a:spcAft>
+            </a:pPr>
+            <a:endParaRPr lang="en-US" sz="2353" dirty="0" err="1">
+              <a:gradFill>
+                <a:gsLst>
+                  <a:gs pos="2917">
+                    <a:schemeClr val="tx1"/>
+                  </a:gs>
+                  <a:gs pos="30000">
+                    <a:schemeClr val="tx1"/>
+                  </a:gs>
+                </a:gsLst>
+                <a:lin ang="5400000" scaled="0"/>
+              </a:gradFill>
+            </a:endParaRPr>
+          </a:p>
+        </p:txBody>
+      </p:sp>
+      <p:sp>
+        <p:nvSpPr>
+          <p:cNvPr id="12" name="TextBox 11"/>
+          <p:cNvSpPr txBox="1"/>
+          <p:nvPr/>
+        </p:nvSpPr>
+        <p:spPr>
+          <a:xfrm>
+            <a:off x="843978" y="4501201"/>
+            <a:ext cx="5966529" cy="641215"/>
+          </a:xfrm>
+          <a:prstGeom prst="rect">
+            <a:avLst/>
+          </a:prstGeom>
+          <a:noFill/>
+          <a:ln w="12700" cap="flat">
+            <a:noFill/>
+            <a:miter lim="400000"/>
+          </a:ln>
+          <a:effectLst/>
+        </p:spPr>
+        <p:style>
+          <a:lnRef idx="0">
+            <a:scrgbClr r="0" g="0" b="0"/>
+          </a:lnRef>
+          <a:fillRef idx="0">
+            <a:scrgbClr r="0" g="0" b="0"/>
+          </a:fillRef>
+          <a:effectRef idx="0">
+            <a:scrgbClr r="0" g="0" b="0"/>
+          </a:effectRef>
+          <a:fontRef idx="none"/>
+        </p:style>
+        <p:txBody>
+          <a:bodyPr rot="0" spcFirstLastPara="1" vertOverflow="overflow" horzOverflow="overflow" vert="horz" wrap="square" lIns="18676" tIns="18676" rIns="18676" bIns="18676" numCol="1" spcCol="14288" rtlCol="0" anchor="ctr">
+            <a:spAutoFit/>
+          </a:bodyPr>
+          <a:lstStyle/>
+          <a:p>
+            <a:r>
+              <a:rPr lang="en-US" sz="1961" dirty="0">
+                <a:cs typeface="Arial"/>
+              </a:rPr>
+              <a:t>&lt;Name&gt;</a:t>
+            </a:r>
+          </a:p>
+          <a:p>
+            <a:r>
+              <a:rPr lang="en-US" sz="1961" dirty="0">
+                <a:latin typeface="+mj-lt"/>
+                <a:cs typeface="Arial"/>
+              </a:rPr>
+              <a:t>&lt;Title&gt;</a:t>
+            </a:r>
+          </a:p>
+        </p:txBody>
+      </p:sp>
+      <p:cxnSp>
+        <p:nvCxnSpPr>
+          <p:cNvPr id="14" name="Straight Connector 13"/>
+          <p:cNvCxnSpPr/>
+          <p:nvPr/>
+        </p:nvCxnSpPr>
+        <p:spPr>
+          <a:xfrm flipV="1">
+            <a:off x="883365" y="5615628"/>
+            <a:ext cx="9367329" cy="4668"/>
+          </a:xfrm>
+          <a:prstGeom prst="line">
+            <a:avLst/>
+          </a:prstGeom>
+          <a:ln>
+            <a:solidFill>
+              <a:srgbClr val="16ACEE"/>
+            </a:solidFill>
+            <a:headEnd type="none"/>
+            <a:tailEnd type="none"/>
+          </a:ln>
+        </p:spPr>
+        <p:style>
+          <a:lnRef idx="2">
+            <a:schemeClr val="accent6"/>
+          </a:lnRef>
+          <a:fillRef idx="0">
+            <a:schemeClr val="accent6"/>
+          </a:fillRef>
+          <a:effectRef idx="1">
+            <a:schemeClr val="accent6"/>
+          </a:effectRef>
+          <a:fontRef idx="minor">
+            <a:schemeClr val="tx1"/>
+          </a:fontRef>
+        </p:style>
+      </p:cxnSp>
+      <p:grpSp>
+        <p:nvGrpSpPr>
+          <p:cNvPr id="9" name="Group 8"/>
+          <p:cNvGrpSpPr/>
+          <p:nvPr/>
+        </p:nvGrpSpPr>
+        <p:grpSpPr>
+          <a:xfrm>
+            <a:off x="808663" y="5844402"/>
+            <a:ext cx="9541633" cy="761555"/>
+            <a:chOff x="1735137" y="5935662"/>
+            <a:chExt cx="9732963" cy="776826"/>
+          </a:xfrm>
+        </p:grpSpPr>
+        <p:sp>
+          <p:nvSpPr>
+            <p:cNvPr id="10" name="TextBox 9"/>
+            <p:cNvSpPr txBox="1"/>
+            <p:nvPr/>
+          </p:nvSpPr>
+          <p:spPr>
+            <a:xfrm>
+              <a:off x="1735137" y="5935662"/>
+              <a:ext cx="2328863" cy="416635"/>
+            </a:xfrm>
+            <a:prstGeom prst="rect">
+              <a:avLst/>
+            </a:prstGeom>
+            <a:noFill/>
+          </p:spPr>
+          <p:txBody>
+            <a:bodyPr wrap="square" rtlCol="0">
+              <a:spAutoFit/>
+            </a:bodyPr>
+            <a:lstStyle/>
+            <a:p>
+              <a:pPr>
+                <a:lnSpc>
+                  <a:spcPct val="130000"/>
+                </a:lnSpc>
+              </a:pPr>
+              <a:r>
+                <a:rPr lang="en-US" sz="1765" dirty="0">
+                  <a:latin typeface="+mj-lt"/>
+                  <a:cs typeface="Arial"/>
+                </a:rPr>
+                <a:t>&lt;email&gt;</a:t>
+              </a:r>
+            </a:p>
+          </p:txBody>
+        </p:sp>
+        <p:sp>
+          <p:nvSpPr>
+            <p:cNvPr id="11" name="TextBox 10"/>
+            <p:cNvSpPr txBox="1"/>
+            <p:nvPr/>
+          </p:nvSpPr>
+          <p:spPr>
+            <a:xfrm>
+              <a:off x="5833269" y="5935662"/>
+              <a:ext cx="2024063" cy="416635"/>
+            </a:xfrm>
+            <a:prstGeom prst="rect">
+              <a:avLst/>
+            </a:prstGeom>
+            <a:noFill/>
+          </p:spPr>
+          <p:txBody>
+            <a:bodyPr wrap="square" rtlCol="0">
+              <a:spAutoFit/>
+            </a:bodyPr>
+            <a:lstStyle/>
+            <a:p>
+              <a:pPr algn="ctr">
+                <a:lnSpc>
+                  <a:spcPct val="130000"/>
+                </a:lnSpc>
+              </a:pPr>
+              <a:r>
+                <a:rPr lang="en-US" sz="1765" dirty="0">
+                  <a:latin typeface="+mj-lt"/>
+                  <a:cs typeface="Arial"/>
+                </a:rPr>
+                <a:t>&lt;website&gt;</a:t>
+              </a:r>
+            </a:p>
+          </p:txBody>
+        </p:sp>
+        <p:sp>
+          <p:nvSpPr>
+            <p:cNvPr id="15" name="TextBox 14"/>
+            <p:cNvSpPr txBox="1"/>
+            <p:nvPr/>
+          </p:nvSpPr>
+          <p:spPr>
+            <a:xfrm>
+              <a:off x="8978900" y="5935662"/>
+              <a:ext cx="2489200" cy="776826"/>
+            </a:xfrm>
+            <a:prstGeom prst="rect">
+              <a:avLst/>
+            </a:prstGeom>
+            <a:noFill/>
+          </p:spPr>
+          <p:txBody>
+            <a:bodyPr wrap="square" rtlCol="0">
+              <a:spAutoFit/>
+            </a:bodyPr>
+            <a:lstStyle/>
+            <a:p>
+              <a:pPr algn="r">
+                <a:lnSpc>
+                  <a:spcPct val="130000"/>
+                </a:lnSpc>
+              </a:pPr>
+              <a:r>
+                <a:rPr lang="en-US" sz="1765" dirty="0">
+                  <a:latin typeface="+mj-lt"/>
+                  <a:cs typeface="Arial"/>
+                </a:rPr>
+                <a:t>@&lt;twitter&gt;</a:t>
+              </a:r>
+            </a:p>
+            <a:p>
+              <a:pPr algn="r">
+                <a:lnSpc>
+                  <a:spcPct val="130000"/>
+                </a:lnSpc>
+              </a:pPr>
+              <a:r>
+                <a:rPr lang="en-US" sz="1765" dirty="0">
+                  <a:latin typeface="+mj-lt"/>
+                  <a:cs typeface="Arial"/>
+                </a:rPr>
+                <a:t>/&lt;YouTube&gt;</a:t>
+              </a:r>
+            </a:p>
+          </p:txBody>
+        </p:sp>
+      </p:grpSp>
+      <p:pic>
+        <p:nvPicPr>
+          <p:cNvPr id="1026" name="Picture 2" descr="See the source image">
+            <a:extLst>
+              <a:ext uri="{FF2B5EF4-FFF2-40B4-BE49-F238E27FC236}">
+                <a16:creationId xmlns:a16="http://schemas.microsoft.com/office/drawing/2014/main" id="{9B5CF540-6DA5-4412-A609-5262A53EA2F9}"/>
+              </a:ext>
+            </a:extLst>
+          </p:cNvPr>
+          <p:cNvPicPr>
+            <a:picLocks noChangeAspect="1" noChangeArrowheads="1"/>
+          </p:cNvPicPr>
+          <p:nvPr/>
+        </p:nvPicPr>
+        <p:blipFill>
+          <a:blip r:embed="rId3">
+            <a:extLst>
+              <a:ext uri="{28A0092B-C50C-407E-A947-70E740481C1C}">
+                <a14:useLocalDpi xmlns:a14="http://schemas.microsoft.com/office/drawing/2010/main" val="0"/>
+              </a:ext>
+            </a:extLst>
+          </a:blip>
+          <a:srcRect/>
+          <a:stretch>
+            <a:fillRect/>
+          </a:stretch>
+        </p:blipFill>
+        <p:spPr bwMode="auto">
+          <a:xfrm>
+            <a:off x="7788624" y="5926339"/>
+            <a:ext cx="326511" cy="326511"/>
+          </a:xfrm>
+          <a:prstGeom prst="rect">
+            <a:avLst/>
+          </a:prstGeom>
+          <a:noFill/>
+          <a:extLst>
+            <a:ext uri="{909E8E84-426E-40DD-AFC4-6F175D3DCCD1}">
+              <a14:hiddenFill xmlns:a14="http://schemas.microsoft.com/office/drawing/2010/main">
+                <a:solidFill>
+                  <a:srgbClr val="FFFFFF"/>
+                </a:solidFill>
+              </a14:hiddenFill>
+            </a:ext>
+          </a:extLst>
+        </p:spPr>
+      </p:pic>
+      <p:pic>
+        <p:nvPicPr>
+          <p:cNvPr id="1028" name="Picture 4" descr="See the source image">
+            <a:extLst>
+              <a:ext uri="{FF2B5EF4-FFF2-40B4-BE49-F238E27FC236}">
+                <a16:creationId xmlns:a16="http://schemas.microsoft.com/office/drawing/2014/main" id="{5010391C-E630-4CE0-AF40-750F7E85C5C9}"/>
+              </a:ext>
+            </a:extLst>
+          </p:cNvPr>
+          <p:cNvPicPr>
+            <a:picLocks noChangeAspect="1" noChangeArrowheads="1"/>
+          </p:cNvPicPr>
+          <p:nvPr/>
+        </p:nvPicPr>
+        <p:blipFill>
+          <a:blip r:embed="rId4">
+            <a:extLst>
+              <a:ext uri="{28A0092B-C50C-407E-A947-70E740481C1C}">
+                <a14:useLocalDpi xmlns:a14="http://schemas.microsoft.com/office/drawing/2010/main" val="0"/>
+              </a:ext>
+            </a:extLst>
+          </a:blip>
+          <a:srcRect/>
+          <a:stretch>
+            <a:fillRect/>
+          </a:stretch>
+        </p:blipFill>
+        <p:spPr bwMode="auto">
+          <a:xfrm>
+            <a:off x="7736286" y="6233475"/>
+            <a:ext cx="431185" cy="431185"/>
+          </a:xfrm>
+          <a:prstGeom prst="rect">
+            <a:avLst/>
+          </a:prstGeom>
+          <a:noFill/>
+          <a:extLst>
+            <a:ext uri="{909E8E84-426E-40DD-AFC4-6F175D3DCCD1}">
+              <a14:hiddenFill xmlns:a14="http://schemas.microsoft.com/office/drawing/2010/main">
+                <a:solidFill>
+                  <a:srgbClr val="FFFFFF"/>
+                </a:solidFill>
+              </a14:hiddenFill>
+            </a:ext>
+          </a:extLst>
+        </p:spPr>
+      </p:pic>
+    </p:spTree>
+    <p:extLst>
+      <p:ext uri="{BB962C8B-B14F-4D97-AF65-F5344CB8AC3E}">
+        <p14:creationId xmlns:p14="http://schemas.microsoft.com/office/powerpoint/2010/main" val="1975960378"/>
+      </p:ext>
+    </p:extLst>
+  </p:cSld>
+  <p:clrMapOvr>
+    <a:masterClrMapping/>
+  </p:clrMapOvr>
+  <p:transition>
+    <p:fade/>
+  </p:transition>
+  <p:timing>
+    <p:tnLst>
+      <p:par>
+        <p:cTn id="1" dur="indefinite" restart="never" nodeType="tmRoot">
+          <p:childTnLst>
+            <p:seq concurrent="1" nextAc="seek">
+              <p:cTn id="2" dur="indefinite" nodeType="mainSeq">
+                <p:childTnLst>
+                  <p:par>
+                    <p:cTn id="3" fill="hold">
+                      <p:stCondLst>
+                        <p:cond delay="indefinite"/>
+                        <p:cond evt="onBegin" delay="0">
+                          <p:tn val="2"/>
+                        </p:cond>
+                      </p:stCondLst>
+                      <p:childTnLst>
+                        <p:par>
+                          <p:cTn id="4" fill="hold">
+                            <p:stCondLst>
+                              <p:cond delay="0"/>
+                            </p:stCondLst>
+                            <p:childTnLst>
+                              <p:par>
+                                <p:cTn id="5" presetID="10" presetClass="entr" presetSubtype="0" fill="hold" grpId="0" nodeType="afterEffect">
+                                  <p:stCondLst>
+                                    <p:cond delay="0"/>
+                                  </p:stCondLst>
+                                  <p:childTnLst>
+                                    <p:set>
+                                      <p:cBhvr>
+                                        <p:cTn id="6" dur="1" fill="hold">
+                                          <p:stCondLst>
+                                            <p:cond delay="0"/>
+                                          </p:stCondLst>
+                                        </p:cTn>
+                                        <p:tgtEl>
+                                          <p:spTgt spid="27"/>
+                                        </p:tgtEl>
+                                        <p:attrNameLst>
+                                          <p:attrName>style.visibility</p:attrName>
+                                        </p:attrNameLst>
+                                      </p:cBhvr>
+                                      <p:to>
+                                        <p:strVal val="visible"/>
+                                      </p:to>
+                                    </p:set>
+                                    <p:animEffect transition="in" filter="fade">
+                                      <p:cBhvr>
+                                        <p:cTn id="7" dur="500"/>
+                                        <p:tgtEl>
+                                          <p:spTgt spid="27"/>
+                                        </p:tgtEl>
+                                      </p:cBhvr>
+                                    </p:animEffect>
+                                  </p:childTnLst>
+                                </p:cTn>
+                              </p:par>
+                            </p:childTnLst>
+                          </p:cTn>
+                        </p:par>
+                      </p:childTnLst>
+                    </p:cTn>
+                  </p:par>
+                </p:childTnLst>
+              </p:cTn>
+              <p:prevCondLst>
+                <p:cond evt="onPrev" delay="0">
+                  <p:tgtEl>
+                    <p:sldTgt/>
+                  </p:tgtEl>
+                </p:cond>
+              </p:prevCondLst>
+              <p:nextCondLst>
+                <p:cond evt="onNext" delay="0">
+                  <p:tgtEl>
+                    <p:sldTgt/>
+                  </p:tgtEl>
+                </p:cond>
+              </p:nextCondLst>
+            </p:seq>
+          </p:childTnLst>
+        </p:cTn>
+      </p:par>
+    </p:tnLst>
+    <p:bldLst>
+      <p:bldP spid="27" grpId="0"/>
+    </p:bldLst>
+  </p:timing>
+</p:sld>
+</file>
+
+<file path=ppt/slides/slide18.xml><?xml version="1.0" encoding="utf-8"?>
+<p:sld xmlns:a="http://schemas.openxmlformats.org/drawingml/2006/main" xmlns:r="http://schemas.openxmlformats.org/officeDocument/2006/relationships" xmlns:p="http://schemas.openxmlformats.org/presentationml/2006/main" show="0">
   <p:cSld>
     <p:spTree>
       <p:nvGrpSpPr>
@@ -11913,137 +12853,6 @@
       </p:grpSp>
       <p:pic>
         <p:nvPicPr>
-          <p:cNvPr id="13" name="Picture 12">
-            <a:extLst>
-              <a:ext uri="{FF2B5EF4-FFF2-40B4-BE49-F238E27FC236}">
-                <a16:creationId xmlns:a16="http://schemas.microsoft.com/office/drawing/2014/main" id="{9D574FF3-0A98-4A53-BD42-1250F2BAA987}"/>
-              </a:ext>
-            </a:extLst>
-          </p:cNvPr>
-          <p:cNvPicPr>
-            <a:picLocks noChangeAspect="1"/>
-          </p:cNvPicPr>
-          <p:nvPr/>
-        </p:nvPicPr>
-        <p:blipFill>
-          <a:blip r:embed="rId4">
-            <a:extLst>
-              <a:ext uri="{28A0092B-C50C-407E-A947-70E740481C1C}">
-                <a14:useLocalDpi xmlns:a14="http://schemas.microsoft.com/office/drawing/2010/main"/>
-              </a:ext>
-            </a:extLst>
-          </a:blip>
-          <a:stretch>
-            <a:fillRect/>
-          </a:stretch>
-        </p:blipFill>
-        <p:spPr>
-          <a:xfrm>
-            <a:off x="8680990" y="1860519"/>
-            <a:ext cx="1491986" cy="1491986"/>
-          </a:xfrm>
-          <a:prstGeom prst="rect">
-            <a:avLst/>
-          </a:prstGeom>
-        </p:spPr>
-      </p:pic>
-      <p:sp>
-        <p:nvSpPr>
-          <p:cNvPr id="16" name="TextBox 15">
-            <a:extLst>
-              <a:ext uri="{FF2B5EF4-FFF2-40B4-BE49-F238E27FC236}">
-                <a16:creationId xmlns:a16="http://schemas.microsoft.com/office/drawing/2014/main" id="{C0775226-AE89-4EB3-80AD-2BED47FD58CE}"/>
-              </a:ext>
-            </a:extLst>
-          </p:cNvPr>
-          <p:cNvSpPr txBox="1"/>
-          <p:nvPr/>
-        </p:nvSpPr>
-        <p:spPr>
-          <a:xfrm>
-            <a:off x="7528441" y="3390702"/>
-            <a:ext cx="3797085" cy="926407"/>
-          </a:xfrm>
-          <a:prstGeom prst="rect">
-            <a:avLst/>
-          </a:prstGeom>
-          <a:noFill/>
-        </p:spPr>
-        <p:txBody>
-          <a:bodyPr wrap="square" rtlCol="0">
-            <a:spAutoFit/>
-          </a:bodyPr>
-          <a:lstStyle/>
-          <a:p>
-            <a:pPr marL="0" marR="0" lvl="0" indent="0" algn="ctr" defTabSz="457080" rtl="0" eaLnBrk="1" fontAlgn="auto" latinLnBrk="0" hangingPunct="1">
-              <a:lnSpc>
-                <a:spcPct val="130000"/>
-              </a:lnSpc>
-              <a:spcBef>
-                <a:spcPts val="0"/>
-              </a:spcBef>
-              <a:spcAft>
-                <a:spcPts val="0"/>
-              </a:spcAft>
-              <a:buClrTx/>
-              <a:buSzTx/>
-              <a:buFontTx/>
-              <a:buNone/>
-              <a:tabLst/>
-              <a:defRPr/>
-            </a:pPr>
-            <a:r>
-              <a:rPr kumimoji="0" lang="en-US" sz="2200" b="0" i="0" u="none" strike="noStrike" kern="0" cap="none" spc="0" normalizeH="0" baseline="0" noProof="0" dirty="0">
-                <a:ln>
-                  <a:noFill/>
-                </a:ln>
-                <a:effectLst/>
-                <a:uLnTx/>
-                <a:uFillTx/>
-                <a:latin typeface="Segoe UI Light"/>
-                <a:ea typeface=""/>
-                <a:cs typeface="Arial"/>
-              </a:rPr>
-              <a:t>Weekly development podcast</a:t>
-            </a:r>
-          </a:p>
-          <a:p>
-            <a:pPr marL="0" marR="0" lvl="0" indent="0" algn="ctr" defTabSz="457080" rtl="0" eaLnBrk="1" fontAlgn="auto" latinLnBrk="0" hangingPunct="1">
-              <a:lnSpc>
-                <a:spcPct val="130000"/>
-              </a:lnSpc>
-              <a:spcBef>
-                <a:spcPts val="0"/>
-              </a:spcBef>
-              <a:spcAft>
-                <a:spcPts val="0"/>
-              </a:spcAft>
-              <a:buClrTx/>
-              <a:buSzTx/>
-              <a:buFontTx/>
-              <a:buNone/>
-              <a:tabLst/>
-              <a:defRPr/>
-            </a:pPr>
-            <a:r>
-              <a:rPr kumimoji="0" lang="en-US" sz="2200" b="0" i="0" u="none" strike="noStrike" kern="0" cap="none" spc="0" normalizeH="0" baseline="0" noProof="0" dirty="0">
-                <a:ln>
-                  <a:noFill/>
-                </a:ln>
-                <a:effectLst/>
-                <a:uLnTx/>
-                <a:uFillTx/>
-                <a:latin typeface="Segoe UI Light"/>
-                <a:ea typeface=""/>
-                <a:cs typeface="Arial"/>
-              </a:rPr>
-              <a:t>mergeconflict.fm</a:t>
-            </a:r>
-          </a:p>
-        </p:txBody>
-      </p:sp>
-      <p:pic>
-        <p:nvPicPr>
           <p:cNvPr id="1026" name="Picture 2" descr="See the source image">
             <a:extLst>
               <a:ext uri="{FF2B5EF4-FFF2-40B4-BE49-F238E27FC236}">
@@ -12057,7 +12866,7 @@
           <p:nvPr/>
         </p:nvPicPr>
         <p:blipFill>
-          <a:blip r:embed="rId5">
+          <a:blip r:embed="rId4">
             <a:extLst>
               <a:ext uri="{28A0092B-C50C-407E-A947-70E740481C1C}">
                 <a14:useLocalDpi xmlns:a14="http://schemas.microsoft.com/office/drawing/2010/main" val="0"/>
@@ -12104,7 +12913,7 @@
           <p:nvPr/>
         </p:nvPicPr>
         <p:blipFill>
-          <a:blip r:embed="rId6">
+          <a:blip r:embed="rId5">
             <a:extLst>
               <a:ext uri="{28A0092B-C50C-407E-A947-70E740481C1C}">
                 <a14:useLocalDpi xmlns:a14="http://schemas.microsoft.com/office/drawing/2010/main" val="0"/>
@@ -13218,7 +14027,7 @@
                 <a:effectLst/>
                 <a:latin typeface="Consolas" panose="020B0609020204030204" pitchFamily="49" charset="0"/>
               </a:rPr>
-              <a:t>net6.0-android;net6.0-ios;net6.0-maccatalyst;net6.0-windows10.0.19041</a:t>
+              <a:t>net8.0-android;net8.0-ios;net8.0-maccatalyst;net8.0-windows10.0.19041</a:t>
             </a:r>
           </a:p>
           <a:p>

</xml_diff>

<commit_message>
Buncha slide updates! (#136)
* Fixing part 0 slides inc removing the montemagno branding, old dotnet 6 stuff, updated design

* updating part 1 slides

* slide updates and deleting old junk

* moar slide updates

* re-adding part 5 lol

* shrink slides

---------

Co-authored-by: James Montemagno <james.montemagno@gmail.com>
</commit_message>
<xml_diff>
--- a/Slides/Workshop1 - Our First App.pptx
+++ b/Slides/Workshop1 - Our First App.pptx
@@ -24,7 +24,7 @@
     <p:sldId id="295" r:id="rId15"/>
     <p:sldId id="296" r:id="rId16"/>
     <p:sldId id="323" r:id="rId17"/>
-    <p:sldId id="8394" r:id="rId18"/>
+    <p:sldId id="282" r:id="rId18"/>
   </p:sldIdLst>
   <p:sldSz cx="12192000" cy="6858000"/>
   <p:notesSz cx="6858000" cy="9144000"/>
@@ -238,7 +238,7 @@
           <a:p>
             <a:fld id="{A334C884-B1D7-A043-A4AA-521744755A4B}" type="datetimeFigureOut">
               <a:rPr lang="en-US" smtClean="0"/>
-              <a:t>3/30/2022</a:t>
+              <a:t>6/11/2024</a:t>
             </a:fld>
             <a:endParaRPr lang="en-US"/>
           </a:p>
@@ -1356,7 +1356,7 @@
           <a:p>
             <a:fld id="{E74353ED-ACB2-44BF-A903-985B0AF962B7}" type="datetime1">
               <a:rPr lang="en-US" smtClean="0"/>
-              <a:t>3/30/2022</a:t>
+              <a:t>6/11/2024</a:t>
             </a:fld>
             <a:endParaRPr lang="en-US" dirty="0"/>
           </a:p>
@@ -7723,7 +7723,7 @@
             </a:br>
             <a:r>
               <a:rPr lang="en-US" sz="5400" b="1" dirty="0"/>
-              <a:t>Our First App</a:t>
+              <a:t>Part 1: Our First App</a:t>
             </a:r>
           </a:p>
         </p:txBody>
@@ -7747,42 +7747,6 @@
           </a:p>
         </p:txBody>
       </p:sp>
-      <p:pic>
-        <p:nvPicPr>
-          <p:cNvPr id="14" name="Picture 13">
-            <a:extLst>
-              <a:ext uri="{FF2B5EF4-FFF2-40B4-BE49-F238E27FC236}">
-                <a16:creationId xmlns:a16="http://schemas.microsoft.com/office/drawing/2014/main" id="{2B9DAD5B-03C7-43FE-A3F9-29F44B946B48}"/>
-              </a:ext>
-            </a:extLst>
-          </p:cNvPr>
-          <p:cNvPicPr>
-            <a:picLocks noChangeAspect="1"/>
-          </p:cNvPicPr>
-          <p:nvPr/>
-        </p:nvPicPr>
-        <p:blipFill>
-          <a:blip r:embed="rId2">
-            <a:extLst>
-              <a:ext uri="{28A0092B-C50C-407E-A947-70E740481C1C}">
-                <a14:useLocalDpi xmlns:a14="http://schemas.microsoft.com/office/drawing/2010/main" val="0"/>
-              </a:ext>
-            </a:extLst>
-          </a:blip>
-          <a:stretch>
-            <a:fillRect/>
-          </a:stretch>
-        </p:blipFill>
-        <p:spPr>
-          <a:xfrm>
-            <a:off x="281182" y="4673121"/>
-            <a:ext cx="557054" cy="1890129"/>
-          </a:xfrm>
-          <a:prstGeom prst="rect">
-            <a:avLst/>
-          </a:prstGeom>
-        </p:spPr>
-      </p:pic>
       <p:sp>
         <p:nvSpPr>
           <p:cNvPr id="15" name="TextBox 14">
@@ -7797,7 +7761,7 @@
         </p:nvSpPr>
         <p:spPr>
           <a:xfrm>
-            <a:off x="1329544" y="4970898"/>
+            <a:off x="545772" y="5062410"/>
             <a:ext cx="5966529" cy="641215"/>
           </a:xfrm>
           <a:prstGeom prst="rect">
@@ -7832,7 +7796,7 @@
               <a:rPr lang="en-US" sz="1961" dirty="0">
                 <a:cs typeface="Arial"/>
               </a:rPr>
-              <a:t>James Montemagno</a:t>
+              <a:t>&lt;Name&gt;</a:t>
             </a:r>
           </a:p>
           <a:p>
@@ -7841,7 +7805,7 @@
                 <a:latin typeface="+mj-lt"/>
                 <a:cs typeface="Arial"/>
               </a:rPr>
-              <a:t>Principal Lead PM – Developer Community, Microsoft</a:t>
+              <a:t>&lt;Role&gt;</a:t>
             </a:r>
           </a:p>
         </p:txBody>
@@ -7860,7 +7824,7 @@
         </p:nvSpPr>
         <p:spPr>
           <a:xfrm>
-            <a:off x="1503286" y="5644613"/>
+            <a:off x="719514" y="5736125"/>
             <a:ext cx="2440268" cy="761555"/>
           </a:xfrm>
           <a:prstGeom prst="rect">
@@ -7884,7 +7848,7 @@
                 <a:latin typeface="+mj-lt"/>
                 <a:cs typeface="Arial"/>
               </a:rPr>
-              <a:t>@JamesMontemagno</a:t>
+              <a:t>@&lt;Twitter&gt;</a:t>
             </a:r>
           </a:p>
           <a:p>
@@ -7898,19 +7862,8 @@
                 <a:latin typeface="+mj-lt"/>
                 <a:cs typeface="Arial"/>
               </a:rPr>
-              <a:t>/</a:t>
-            </a:r>
-            <a:r>
-              <a:rPr lang="en-US" sz="1765" dirty="0" err="1">
-                <a:latin typeface="+mj-lt"/>
-                <a:cs typeface="Arial"/>
-              </a:rPr>
-              <a:t>JamesMontemagno</a:t>
-            </a:r>
-            <a:endParaRPr lang="en-US" sz="1765" dirty="0">
-              <a:latin typeface="+mj-lt"/>
-              <a:cs typeface="Arial"/>
-            </a:endParaRPr>
+              <a:t>/&lt;YouTube&gt;</a:t>
+            </a:r>
           </a:p>
         </p:txBody>
       </p:sp>
@@ -7920,6 +7873,53 @@
             <a:extLst>
               <a:ext uri="{FF2B5EF4-FFF2-40B4-BE49-F238E27FC236}">
                 <a16:creationId xmlns:a16="http://schemas.microsoft.com/office/drawing/2014/main" id="{5085402D-4D72-42FE-AEE3-940D913854DD}"/>
+              </a:ext>
+            </a:extLst>
+          </p:cNvPr>
+          <p:cNvPicPr>
+            <a:picLocks noChangeAspect="1" noChangeArrowheads="1"/>
+          </p:cNvPicPr>
+          <p:nvPr/>
+        </p:nvPicPr>
+        <p:blipFill>
+          <a:blip r:embed="rId2">
+            <a:extLst>
+              <a:ext uri="{28A0092B-C50C-407E-A947-70E740481C1C}">
+                <a14:useLocalDpi xmlns:a14="http://schemas.microsoft.com/office/drawing/2010/main" val="0"/>
+              </a:ext>
+            </a:extLst>
+          </a:blip>
+          <a:srcRect/>
+          <a:stretch>
+            <a:fillRect/>
+          </a:stretch>
+        </p:blipFill>
+        <p:spPr bwMode="auto">
+          <a:xfrm>
+            <a:off x="598110" y="5818062"/>
+            <a:ext cx="326511" cy="326511"/>
+          </a:xfrm>
+          <a:prstGeom prst="rect">
+            <a:avLst/>
+          </a:prstGeom>
+          <a:noFill/>
+          <a:extLst>
+            <a:ext uri="{909E8E84-426E-40DD-AFC4-6F175D3DCCD1}">
+              <a14:hiddenFill xmlns:a14="http://schemas.microsoft.com/office/drawing/2010/main">
+                <a:solidFill>
+                  <a:srgbClr val="FFFFFF"/>
+                </a:solidFill>
+              </a14:hiddenFill>
+            </a:ext>
+          </a:extLst>
+        </p:spPr>
+      </p:pic>
+      <p:pic>
+        <p:nvPicPr>
+          <p:cNvPr id="22" name="Picture 4" descr="See the source image">
+            <a:extLst>
+              <a:ext uri="{FF2B5EF4-FFF2-40B4-BE49-F238E27FC236}">
+                <a16:creationId xmlns:a16="http://schemas.microsoft.com/office/drawing/2014/main" id="{29903BF8-06F8-4657-993C-F74F21394EBB}"/>
               </a:ext>
             </a:extLst>
           </p:cNvPr>
@@ -7943,54 +7943,7 @@
         </p:blipFill>
         <p:spPr bwMode="auto">
           <a:xfrm>
-            <a:off x="1381882" y="5726550"/>
-            <a:ext cx="326511" cy="326511"/>
-          </a:xfrm>
-          <a:prstGeom prst="rect">
-            <a:avLst/>
-          </a:prstGeom>
-          <a:noFill/>
-          <a:extLst>
-            <a:ext uri="{909E8E84-426E-40DD-AFC4-6F175D3DCCD1}">
-              <a14:hiddenFill xmlns:a14="http://schemas.microsoft.com/office/drawing/2010/main">
-                <a:solidFill>
-                  <a:srgbClr val="FFFFFF"/>
-                </a:solidFill>
-              </a14:hiddenFill>
-            </a:ext>
-          </a:extLst>
-        </p:spPr>
-      </p:pic>
-      <p:pic>
-        <p:nvPicPr>
-          <p:cNvPr id="22" name="Picture 4" descr="See the source image">
-            <a:extLst>
-              <a:ext uri="{FF2B5EF4-FFF2-40B4-BE49-F238E27FC236}">
-                <a16:creationId xmlns:a16="http://schemas.microsoft.com/office/drawing/2014/main" id="{29903BF8-06F8-4657-993C-F74F21394EBB}"/>
-              </a:ext>
-            </a:extLst>
-          </p:cNvPr>
-          <p:cNvPicPr>
-            <a:picLocks noChangeAspect="1" noChangeArrowheads="1"/>
-          </p:cNvPicPr>
-          <p:nvPr/>
-        </p:nvPicPr>
-        <p:blipFill>
-          <a:blip r:embed="rId4">
-            <a:extLst>
-              <a:ext uri="{28A0092B-C50C-407E-A947-70E740481C1C}">
-                <a14:useLocalDpi xmlns:a14="http://schemas.microsoft.com/office/drawing/2010/main" val="0"/>
-              </a:ext>
-            </a:extLst>
-          </a:blip>
-          <a:srcRect/>
-          <a:stretch>
-            <a:fillRect/>
-          </a:stretch>
-        </p:blipFill>
-        <p:spPr bwMode="auto">
-          <a:xfrm>
-            <a:off x="1329544" y="6033686"/>
+            <a:off x="545772" y="6125198"/>
             <a:ext cx="431185" cy="431185"/>
           </a:xfrm>
           <a:prstGeom prst="rect">
@@ -11327,6 +11280,109 @@
           </a:prstGeom>
         </p:spPr>
       </p:pic>
+      <p:sp>
+        <p:nvSpPr>
+          <p:cNvPr id="3" name="TextBox 2">
+            <a:extLst>
+              <a:ext uri="{FF2B5EF4-FFF2-40B4-BE49-F238E27FC236}">
+                <a16:creationId xmlns:a16="http://schemas.microsoft.com/office/drawing/2014/main" id="{FD94B5A4-931C-27D7-5AFE-0109386DB0F8}"/>
+              </a:ext>
+            </a:extLst>
+          </p:cNvPr>
+          <p:cNvSpPr txBox="1"/>
+          <p:nvPr/>
+        </p:nvSpPr>
+        <p:spPr>
+          <a:xfrm>
+            <a:off x="1165664" y="3777342"/>
+            <a:ext cx="4495800" cy="627864"/>
+          </a:xfrm>
+          <a:prstGeom prst="rect">
+            <a:avLst/>
+          </a:prstGeom>
+          <a:noFill/>
+        </p:spPr>
+        <p:txBody>
+          <a:bodyPr wrap="square" lIns="182880" tIns="146304" rIns="182880" bIns="146304" rtlCol="0">
+            <a:spAutoFit/>
+          </a:bodyPr>
+          <a:lstStyle/>
+          <a:p>
+            <a:pPr>
+              <a:lnSpc>
+                <a:spcPct val="90000"/>
+              </a:lnSpc>
+              <a:spcAft>
+                <a:spcPts val="600"/>
+              </a:spcAft>
+            </a:pPr>
+            <a:r>
+              <a:rPr lang="en-US" sz="2400" dirty="0" err="1">
+                <a:gradFill>
+                  <a:gsLst>
+                    <a:gs pos="2917">
+                      <a:schemeClr val="tx1"/>
+                    </a:gs>
+                    <a:gs pos="30000">
+                      <a:schemeClr val="tx1"/>
+                    </a:gs>
+                  </a:gsLst>
+                  <a:lin ang="5400000" scaled="0"/>
+                </a:gradFill>
+              </a:rPr>
+              <a:t>aka.ms</a:t>
+            </a:r>
+            <a:r>
+              <a:rPr lang="en-US" sz="2400" dirty="0">
+                <a:gradFill>
+                  <a:gsLst>
+                    <a:gs pos="2917">
+                      <a:schemeClr val="tx1"/>
+                    </a:gs>
+                    <a:gs pos="30000">
+                      <a:schemeClr val="tx1"/>
+                    </a:gs>
+                  </a:gsLst>
+                  <a:lin ang="5400000" scaled="0"/>
+                </a:gradFill>
+              </a:rPr>
+              <a:t>/</a:t>
+            </a:r>
+            <a:r>
+              <a:rPr lang="en-US" sz="2400" dirty="0" err="1">
+                <a:gradFill>
+                  <a:gsLst>
+                    <a:gs pos="2917">
+                      <a:schemeClr val="tx1"/>
+                    </a:gs>
+                    <a:gs pos="30000">
+                      <a:schemeClr val="tx1"/>
+                    </a:gs>
+                  </a:gsLst>
+                  <a:lin ang="5400000" scaled="0"/>
+                </a:gradFill>
+              </a:rPr>
+              <a:t>maui</a:t>
+            </a:r>
+            <a:r>
+              <a:rPr lang="en-US" sz="2400" dirty="0">
+                <a:gradFill>
+                  <a:gsLst>
+                    <a:gs pos="2917">
+                      <a:schemeClr val="tx1"/>
+                    </a:gs>
+                    <a:gs pos="30000">
+                      <a:schemeClr val="tx1"/>
+                    </a:gs>
+                  </a:gsLst>
+                  <a:lin ang="5400000" scaled="0"/>
+                </a:gradFill>
+              </a:rPr>
+              <a:t>-workshop</a:t>
+            </a:r>
+          </a:p>
+        </p:txBody>
+      </p:sp>
     </p:spTree>
     <p:extLst>
       <p:ext uri="{BB962C8B-B14F-4D97-AF65-F5344CB8AC3E}">
@@ -11370,7 +11426,7 @@
         </p:nvSpPr>
         <p:spPr bwMode="invGray">
           <a:xfrm>
-            <a:off x="687982" y="1706257"/>
+            <a:off x="657703" y="1535076"/>
             <a:ext cx="10321336" cy="821723"/>
           </a:xfrm>
           <a:prstGeom prst="rect">
@@ -11576,85 +11632,15 @@
               </a:rPr>
               <a:t>20 Minute Break</a:t>
             </a:r>
+            <a:endParaRPr lang="en-US" sz="7646" spc="0" dirty="0">
+              <a:solidFill>
+                <a:schemeClr val="tx1"/>
+              </a:solidFill>
+              <a:latin typeface="+mn-lt"/>
+            </a:endParaRPr>
           </a:p>
         </p:txBody>
       </p:sp>
-      <p:sp>
-        <p:nvSpPr>
-          <p:cNvPr id="8" name="TextBox 7"/>
-          <p:cNvSpPr txBox="1"/>
-          <p:nvPr/>
-        </p:nvSpPr>
-        <p:spPr>
-          <a:xfrm>
-            <a:off x="4145965" y="-846623"/>
-            <a:ext cx="362072" cy="621556"/>
-          </a:xfrm>
-          <a:prstGeom prst="rect">
-            <a:avLst/>
-          </a:prstGeom>
-          <a:noFill/>
-        </p:spPr>
-        <p:txBody>
-          <a:bodyPr wrap="none" lIns="179285" tIns="143428" rIns="179285" bIns="143428" rtlCol="0">
-            <a:spAutoFit/>
-          </a:bodyPr>
-          <a:lstStyle/>
-          <a:p>
-            <a:pPr>
-              <a:lnSpc>
-                <a:spcPct val="90000"/>
-              </a:lnSpc>
-              <a:spcAft>
-                <a:spcPts val="588"/>
-              </a:spcAft>
-            </a:pPr>
-            <a:endParaRPr lang="en-US" sz="2353" dirty="0" err="1">
-              <a:gradFill>
-                <a:gsLst>
-                  <a:gs pos="2917">
-                    <a:schemeClr val="tx1"/>
-                  </a:gs>
-                  <a:gs pos="30000">
-                    <a:schemeClr val="tx1"/>
-                  </a:gs>
-                </a:gsLst>
-                <a:lin ang="5400000" scaled="0"/>
-              </a:gradFill>
-            </a:endParaRPr>
-          </a:p>
-        </p:txBody>
-      </p:sp>
-      <p:pic>
-        <p:nvPicPr>
-          <p:cNvPr id="7" name="Picture 6"/>
-          <p:cNvPicPr>
-            <a:picLocks noChangeAspect="1"/>
-          </p:cNvPicPr>
-          <p:nvPr/>
-        </p:nvPicPr>
-        <p:blipFill>
-          <a:blip r:embed="rId3">
-            <a:extLst>
-              <a:ext uri="{28A0092B-C50C-407E-A947-70E740481C1C}">
-                <a14:useLocalDpi xmlns:a14="http://schemas.microsoft.com/office/drawing/2010/main" val="0"/>
-              </a:ext>
-            </a:extLst>
-          </a:blip>
-          <a:stretch>
-            <a:fillRect/>
-          </a:stretch>
-        </p:blipFill>
-        <p:spPr>
-          <a:xfrm>
-            <a:off x="687982" y="4315297"/>
-            <a:ext cx="557054" cy="1890129"/>
-          </a:xfrm>
-          <a:prstGeom prst="rect">
-            <a:avLst/>
-          </a:prstGeom>
-        </p:spPr>
-      </p:pic>
       <p:sp>
         <p:nvSpPr>
           <p:cNvPr id="12" name="TextBox 11"/>
@@ -11663,8 +11649,8 @@
         </p:nvSpPr>
         <p:spPr>
           <a:xfrm>
-            <a:off x="1736344" y="4325390"/>
-            <a:ext cx="5966529" cy="942965"/>
+            <a:off x="843978" y="4501201"/>
+            <a:ext cx="5966529" cy="641215"/>
           </a:xfrm>
           <a:prstGeom prst="rect">
             <a:avLst/>
@@ -11698,19 +11684,8 @@
               <a:rPr lang="en-US" sz="1961" dirty="0">
                 <a:cs typeface="Arial"/>
               </a:rPr>
-              <a:t>James</a:t>
-            </a:r>
-          </a:p>
-          <a:p>
-            <a:r>
-              <a:rPr lang="en-US" sz="1961" dirty="0" err="1">
-                <a:cs typeface="Arial"/>
-              </a:rPr>
-              <a:t>Montemagno</a:t>
-            </a:r>
-            <a:endParaRPr lang="en-US" sz="1961" dirty="0">
-              <a:cs typeface="Arial"/>
-            </a:endParaRPr>
+              <a:t>&lt;Name&gt;</a:t>
+            </a:r>
           </a:p>
           <a:p>
             <a:r>
@@ -11718,7 +11693,7 @@
                 <a:latin typeface="+mj-lt"/>
                 <a:cs typeface="Arial"/>
               </a:rPr>
-              <a:t>Principal Lead PM – Developer Community, Microsoft</a:t>
+              <a:t>&lt;Title&gt;</a:t>
             </a:r>
           </a:p>
         </p:txBody>
@@ -11731,7 +11706,7 @@
         </p:nvCxnSpPr>
         <p:spPr>
           <a:xfrm flipV="1">
-            <a:off x="1775731" y="5590692"/>
+            <a:off x="883365" y="5615628"/>
             <a:ext cx="9367329" cy="4668"/>
           </a:xfrm>
           <a:prstGeom prst="line">
@@ -11768,7 +11743,7 @@
         </p:nvGrpSpPr>
         <p:grpSpPr>
           <a:xfrm>
-            <a:off x="1701029" y="5819466"/>
+            <a:off x="808663" y="5844402"/>
             <a:ext cx="9541633" cy="761555"/>
             <a:chOff x="1735137" y="5935662"/>
             <a:chExt cx="9732963" cy="776826"/>
@@ -11806,7 +11781,7 @@
                   <a:latin typeface="+mj-lt"/>
                   <a:cs typeface="Arial"/>
                 </a:rPr>
-                <a:t>motz@microsoft.com</a:t>
+                <a:t>&lt;email&gt;</a:t>
               </a:r>
             </a:p>
           </p:txBody>
@@ -11843,7 +11818,7 @@
                   <a:latin typeface="+mj-lt"/>
                   <a:cs typeface="Arial"/>
                 </a:rPr>
-                <a:t>montemagno.com</a:t>
+                <a:t>&lt;website&gt;</a:t>
               </a:r>
             </a:p>
           </p:txBody>
@@ -11880,7 +11855,7 @@
                   <a:latin typeface="+mj-lt"/>
                   <a:cs typeface="Arial"/>
                 </a:rPr>
-                <a:t>@JamesMontemagno</a:t>
+                <a:t>@&lt;twitter&gt;</a:t>
               </a:r>
             </a:p>
             <a:p>
@@ -11894,154 +11869,12 @@
                   <a:latin typeface="+mj-lt"/>
                   <a:cs typeface="Arial"/>
                 </a:rPr>
-                <a:t>/</a:t>
+                <a:t>/&lt;YouTube&gt;</a:t>
               </a:r>
-              <a:r>
-                <a:rPr lang="en-US" sz="1765" dirty="0" err="1">
-                  <a:latin typeface="+mj-lt"/>
-                  <a:cs typeface="Arial"/>
-                </a:rPr>
-                <a:t>JamesMontemagno</a:t>
-              </a:r>
-              <a:endParaRPr lang="en-US" sz="1765" dirty="0">
-                <a:latin typeface="+mj-lt"/>
-                <a:cs typeface="Arial"/>
-              </a:endParaRPr>
             </a:p>
           </p:txBody>
         </p:sp>
       </p:grpSp>
-      <p:pic>
-        <p:nvPicPr>
-          <p:cNvPr id="13" name="Picture 12">
-            <a:extLst>
-              <a:ext uri="{FF2B5EF4-FFF2-40B4-BE49-F238E27FC236}">
-                <a16:creationId xmlns:a16="http://schemas.microsoft.com/office/drawing/2014/main" id="{9D574FF3-0A98-4A53-BD42-1250F2BAA987}"/>
-              </a:ext>
-            </a:extLst>
-          </p:cNvPr>
-          <p:cNvPicPr>
-            <a:picLocks noChangeAspect="1"/>
-          </p:cNvPicPr>
-          <p:nvPr/>
-        </p:nvPicPr>
-        <p:blipFill>
-          <a:blip r:embed="rId4">
-            <a:extLst>
-              <a:ext uri="{28A0092B-C50C-407E-A947-70E740481C1C}">
-                <a14:useLocalDpi xmlns:a14="http://schemas.microsoft.com/office/drawing/2010/main"/>
-              </a:ext>
-            </a:extLst>
-          </a:blip>
-          <a:stretch>
-            <a:fillRect/>
-          </a:stretch>
-        </p:blipFill>
-        <p:spPr>
-          <a:xfrm>
-            <a:off x="8680990" y="1860519"/>
-            <a:ext cx="1491986" cy="1491986"/>
-          </a:xfrm>
-          <a:prstGeom prst="rect">
-            <a:avLst/>
-          </a:prstGeom>
-        </p:spPr>
-      </p:pic>
-      <p:sp>
-        <p:nvSpPr>
-          <p:cNvPr id="16" name="TextBox 15">
-            <a:extLst>
-              <a:ext uri="{FF2B5EF4-FFF2-40B4-BE49-F238E27FC236}">
-                <a16:creationId xmlns:a16="http://schemas.microsoft.com/office/drawing/2014/main" id="{C0775226-AE89-4EB3-80AD-2BED47FD58CE}"/>
-              </a:ext>
-            </a:extLst>
-          </p:cNvPr>
-          <p:cNvSpPr txBox="1"/>
-          <p:nvPr/>
-        </p:nvSpPr>
-        <p:spPr>
-          <a:xfrm>
-            <a:off x="7528441" y="3390702"/>
-            <a:ext cx="3797085" cy="926407"/>
-          </a:xfrm>
-          <a:prstGeom prst="rect">
-            <a:avLst/>
-          </a:prstGeom>
-          <a:noFill/>
-        </p:spPr>
-        <p:txBody>
-          <a:bodyPr wrap="square" rtlCol="0">
-            <a:spAutoFit/>
-          </a:bodyPr>
-          <a:lstStyle/>
-          <a:p>
-            <a:pPr marL="0" marR="0" lvl="0" indent="0" algn="ctr" defTabSz="457080" rtl="0" eaLnBrk="1" fontAlgn="auto" latinLnBrk="0" hangingPunct="1">
-              <a:lnSpc>
-                <a:spcPct val="130000"/>
-              </a:lnSpc>
-              <a:spcBef>
-                <a:spcPts val="0"/>
-              </a:spcBef>
-              <a:spcAft>
-                <a:spcPts val="0"/>
-              </a:spcAft>
-              <a:buClrTx/>
-              <a:buSzTx/>
-              <a:buFontTx/>
-              <a:buNone/>
-              <a:tabLst/>
-              <a:defRPr/>
-            </a:pPr>
-            <a:r>
-              <a:rPr kumimoji="0" lang="en-US" sz="2200" b="0" i="0" u="none" strike="noStrike" kern="0" cap="none" spc="0" normalizeH="0" baseline="0" noProof="0" dirty="0">
-                <a:ln>
-                  <a:noFill/>
-                </a:ln>
-                <a:effectLst/>
-                <a:uLnTx/>
-                <a:uFillTx/>
-                <a:latin typeface="Segoe UI Light"/>
-                <a:ea typeface=""/>
-                <a:cs typeface="Arial"/>
-              </a:rPr>
-              <a:t>Weekly development podcast</a:t>
-            </a:r>
-          </a:p>
-          <a:p>
-            <a:pPr marL="0" marR="0" lvl="0" indent="0" algn="ctr" defTabSz="457080" rtl="0" eaLnBrk="1" fontAlgn="auto" latinLnBrk="0" hangingPunct="1">
-              <a:lnSpc>
-                <a:spcPct val="130000"/>
-              </a:lnSpc>
-              <a:spcBef>
-                <a:spcPts val="0"/>
-              </a:spcBef>
-              <a:spcAft>
-                <a:spcPts val="0"/>
-              </a:spcAft>
-              <a:buClrTx/>
-              <a:buSzTx/>
-              <a:buFontTx/>
-              <a:buNone/>
-              <a:tabLst/>
-              <a:defRPr/>
-            </a:pPr>
-            <a:r>
-              <a:rPr kumimoji="0" lang="en-US" sz="2200" b="0" i="0" u="none" strike="noStrike" kern="0" cap="none" spc="0" normalizeH="0" baseline="0" noProof="0" dirty="0">
-                <a:ln>
-                  <a:noFill/>
-                </a:ln>
-                <a:effectLst/>
-                <a:uLnTx/>
-                <a:uFillTx/>
-                <a:latin typeface="Segoe UI Light"/>
-                <a:ea typeface=""/>
-                <a:cs typeface="Arial"/>
-              </a:rPr>
-              <a:t>mergeconflict.fm</a:t>
-            </a:r>
-          </a:p>
-        </p:txBody>
-      </p:sp>
       <p:pic>
         <p:nvPicPr>
           <p:cNvPr id="1026" name="Picture 2" descr="See the source image">
@@ -12057,7 +11890,7 @@
           <p:nvPr/>
         </p:nvPicPr>
         <p:blipFill>
-          <a:blip r:embed="rId5">
+          <a:blip r:embed="rId3">
             <a:extLst>
               <a:ext uri="{28A0092B-C50C-407E-A947-70E740481C1C}">
                 <a14:useLocalDpi xmlns:a14="http://schemas.microsoft.com/office/drawing/2010/main" val="0"/>
@@ -12071,7 +11904,7 @@
         </p:blipFill>
         <p:spPr bwMode="auto">
           <a:xfrm>
-            <a:off x="8680990" y="5901403"/>
+            <a:off x="7788624" y="5926339"/>
             <a:ext cx="326511" cy="326511"/>
           </a:xfrm>
           <a:prstGeom prst="rect">
@@ -12104,7 +11937,7 @@
           <p:nvPr/>
         </p:nvPicPr>
         <p:blipFill>
-          <a:blip r:embed="rId6">
+          <a:blip r:embed="rId4">
             <a:extLst>
               <a:ext uri="{28A0092B-C50C-407E-A947-70E740481C1C}">
                 <a14:useLocalDpi xmlns:a14="http://schemas.microsoft.com/office/drawing/2010/main" val="0"/>
@@ -12118,7 +11951,7 @@
         </p:blipFill>
         <p:spPr bwMode="auto">
           <a:xfrm>
-            <a:off x="8628652" y="6208539"/>
+            <a:off x="7736286" y="6233475"/>
             <a:ext cx="431185" cy="431185"/>
           </a:xfrm>
           <a:prstGeom prst="rect">
@@ -12139,7 +11972,7 @@
     </p:spTree>
     <p:extLst>
       <p:ext uri="{BB962C8B-B14F-4D97-AF65-F5344CB8AC3E}">
-        <p14:creationId xmlns:p14="http://schemas.microsoft.com/office/powerpoint/2010/main" val="2695355460"/>
+        <p14:creationId xmlns:p14="http://schemas.microsoft.com/office/powerpoint/2010/main" val="1975960378"/>
       </p:ext>
     </p:extLst>
   </p:cSld>
@@ -13218,7 +13051,7 @@
                 <a:effectLst/>
                 <a:latin typeface="Consolas" panose="020B0609020204030204" pitchFamily="49" charset="0"/>
               </a:rPr>
-              <a:t>net6.0-android;net6.0-ios;net6.0-maccatalyst;net6.0-windows10.0.19041</a:t>
+              <a:t>net8.0-android;net8.0-ios;net8.0-maccatalyst;net8.0-windows10.0.19041</a:t>
             </a:r>
           </a:p>
           <a:p>

</xml_diff>